<commit_message>
Spring batch csv demo
</commit_message>
<xml_diff>
--- a/src/main/resources/doc/Spring-batch.pptx
+++ b/src/main/resources/doc/Spring-batch.pptx
@@ -5,17 +5,17 @@
     <p:sldMasterId id="2147483648" r:id="rId1"/>
   </p:sldMasterIdLst>
   <p:sldIdLst>
-    <p:sldId id="256" r:id="rId3"/>
-    <p:sldId id="257" r:id="rId4"/>
-    <p:sldId id="258" r:id="rId5"/>
-    <p:sldId id="260" r:id="rId6"/>
-    <p:sldId id="262" r:id="rId7"/>
-    <p:sldId id="259" r:id="rId8"/>
-    <p:sldId id="263" r:id="rId9"/>
-    <p:sldId id="265" r:id="rId10"/>
-    <p:sldId id="264" r:id="rId11"/>
-    <p:sldId id="266" r:id="rId12"/>
-    <p:sldId id="267" r:id="rId13"/>
+    <p:sldId id="256" r:id="rId2"/>
+    <p:sldId id="257" r:id="rId3"/>
+    <p:sldId id="258" r:id="rId4"/>
+    <p:sldId id="260" r:id="rId5"/>
+    <p:sldId id="262" r:id="rId6"/>
+    <p:sldId id="259" r:id="rId7"/>
+    <p:sldId id="263" r:id="rId8"/>
+    <p:sldId id="265" r:id="rId9"/>
+    <p:sldId id="264" r:id="rId10"/>
+    <p:sldId id="266" r:id="rId11"/>
+    <p:sldId id="267" r:id="rId12"/>
   </p:sldIdLst>
   <p:sldSz cx="9144000" cy="6858000" type="screen4x3"/>
   <p:notesSz cx="6858000" cy="9144000"/>
@@ -298,6 +298,8 @@
           <a:p>
             <a:fld id="{4192D431-89EB-426C-A91B-DFD7E8C5B2E7}" type="datetimeFigureOut">
               <a:rPr lang="zh-CN" altLang="en-US" smtClean="0"/>
+              <a:pPr/>
+              <a:t>2018/1/23</a:t>
             </a:fld>
             <a:endParaRPr lang="zh-CN" altLang="en-US"/>
           </a:p>
@@ -339,6 +341,8 @@
           <a:p>
             <a:fld id="{A9388ECA-052F-47F2-9B79-C3CD57F0E260}" type="slidenum">
               <a:rPr lang="zh-CN" altLang="en-US" smtClean="0"/>
+              <a:pPr/>
+              <a:t>‹#›</a:t>
             </a:fld>
             <a:endParaRPr lang="zh-CN" altLang="en-US"/>
           </a:p>
@@ -412,7 +416,6 @@
               <a:rPr lang="zh-CN" altLang="en-US" smtClean="0"/>
               <a:t>单击此处编辑母版文本样式</a:t>
             </a:r>
-            <a:endParaRPr lang="zh-CN" altLang="en-US" smtClean="0"/>
           </a:p>
           <a:p>
             <a:pPr lvl="1"/>
@@ -420,7 +423,6 @@
               <a:rPr lang="zh-CN" altLang="en-US" smtClean="0"/>
               <a:t>第二级</a:t>
             </a:r>
-            <a:endParaRPr lang="zh-CN" altLang="en-US" smtClean="0"/>
           </a:p>
           <a:p>
             <a:pPr lvl="2"/>
@@ -428,7 +430,6 @@
               <a:rPr lang="zh-CN" altLang="en-US" smtClean="0"/>
               <a:t>第三级</a:t>
             </a:r>
-            <a:endParaRPr lang="zh-CN" altLang="en-US" smtClean="0"/>
           </a:p>
           <a:p>
             <a:pPr lvl="3"/>
@@ -436,7 +437,6 @@
               <a:rPr lang="zh-CN" altLang="en-US" smtClean="0"/>
               <a:t>第四级</a:t>
             </a:r>
-            <a:endParaRPr lang="zh-CN" altLang="en-US" smtClean="0"/>
           </a:p>
           <a:p>
             <a:pPr lvl="4"/>
@@ -465,6 +465,8 @@
           <a:p>
             <a:fld id="{4192D431-89EB-426C-A91B-DFD7E8C5B2E7}" type="datetimeFigureOut">
               <a:rPr lang="zh-CN" altLang="en-US" smtClean="0"/>
+              <a:pPr/>
+              <a:t>2018/1/23</a:t>
             </a:fld>
             <a:endParaRPr lang="zh-CN" altLang="en-US"/>
           </a:p>
@@ -506,6 +508,8 @@
           <a:p>
             <a:fld id="{A9388ECA-052F-47F2-9B79-C3CD57F0E260}" type="slidenum">
               <a:rPr lang="zh-CN" altLang="en-US" smtClean="0"/>
+              <a:pPr/>
+              <a:t>‹#›</a:t>
             </a:fld>
             <a:endParaRPr lang="zh-CN" altLang="en-US"/>
           </a:p>
@@ -589,7 +593,6 @@
               <a:rPr lang="zh-CN" altLang="en-US" smtClean="0"/>
               <a:t>单击此处编辑母版文本样式</a:t>
             </a:r>
-            <a:endParaRPr lang="zh-CN" altLang="en-US" smtClean="0"/>
           </a:p>
           <a:p>
             <a:pPr lvl="1"/>
@@ -597,7 +600,6 @@
               <a:rPr lang="zh-CN" altLang="en-US" smtClean="0"/>
               <a:t>第二级</a:t>
             </a:r>
-            <a:endParaRPr lang="zh-CN" altLang="en-US" smtClean="0"/>
           </a:p>
           <a:p>
             <a:pPr lvl="2"/>
@@ -605,7 +607,6 @@
               <a:rPr lang="zh-CN" altLang="en-US" smtClean="0"/>
               <a:t>第三级</a:t>
             </a:r>
-            <a:endParaRPr lang="zh-CN" altLang="en-US" smtClean="0"/>
           </a:p>
           <a:p>
             <a:pPr lvl="3"/>
@@ -613,7 +614,6 @@
               <a:rPr lang="zh-CN" altLang="en-US" smtClean="0"/>
               <a:t>第四级</a:t>
             </a:r>
-            <a:endParaRPr lang="zh-CN" altLang="en-US" smtClean="0"/>
           </a:p>
           <a:p>
             <a:pPr lvl="4"/>
@@ -642,6 +642,8 @@
           <a:p>
             <a:fld id="{4192D431-89EB-426C-A91B-DFD7E8C5B2E7}" type="datetimeFigureOut">
               <a:rPr lang="zh-CN" altLang="en-US" smtClean="0"/>
+              <a:pPr/>
+              <a:t>2018/1/23</a:t>
             </a:fld>
             <a:endParaRPr lang="zh-CN" altLang="en-US"/>
           </a:p>
@@ -683,6 +685,8 @@
           <a:p>
             <a:fld id="{A9388ECA-052F-47F2-9B79-C3CD57F0E260}" type="slidenum">
               <a:rPr lang="zh-CN" altLang="en-US" smtClean="0"/>
+              <a:pPr/>
+              <a:t>‹#›</a:t>
             </a:fld>
             <a:endParaRPr lang="zh-CN" altLang="en-US"/>
           </a:p>
@@ -756,7 +760,6 @@
               <a:rPr lang="zh-CN" altLang="en-US" smtClean="0"/>
               <a:t>单击此处编辑母版文本样式</a:t>
             </a:r>
-            <a:endParaRPr lang="zh-CN" altLang="en-US" smtClean="0"/>
           </a:p>
           <a:p>
             <a:pPr lvl="1"/>
@@ -764,7 +767,6 @@
               <a:rPr lang="zh-CN" altLang="en-US" smtClean="0"/>
               <a:t>第二级</a:t>
             </a:r>
-            <a:endParaRPr lang="zh-CN" altLang="en-US" smtClean="0"/>
           </a:p>
           <a:p>
             <a:pPr lvl="2"/>
@@ -772,7 +774,6 @@
               <a:rPr lang="zh-CN" altLang="en-US" smtClean="0"/>
               <a:t>第三级</a:t>
             </a:r>
-            <a:endParaRPr lang="zh-CN" altLang="en-US" smtClean="0"/>
           </a:p>
           <a:p>
             <a:pPr lvl="3"/>
@@ -780,7 +781,6 @@
               <a:rPr lang="zh-CN" altLang="en-US" smtClean="0"/>
               <a:t>第四级</a:t>
             </a:r>
-            <a:endParaRPr lang="zh-CN" altLang="en-US" smtClean="0"/>
           </a:p>
           <a:p>
             <a:pPr lvl="4"/>
@@ -809,6 +809,8 @@
           <a:p>
             <a:fld id="{4192D431-89EB-426C-A91B-DFD7E8C5B2E7}" type="datetimeFigureOut">
               <a:rPr lang="zh-CN" altLang="en-US" smtClean="0"/>
+              <a:pPr/>
+              <a:t>2018/1/23</a:t>
             </a:fld>
             <a:endParaRPr lang="zh-CN" altLang="en-US"/>
           </a:p>
@@ -850,6 +852,8 @@
           <a:p>
             <a:fld id="{A9388ECA-052F-47F2-9B79-C3CD57F0E260}" type="slidenum">
               <a:rPr lang="zh-CN" altLang="en-US" smtClean="0"/>
+              <a:pPr/>
+              <a:t>‹#›</a:t>
             </a:fld>
             <a:endParaRPr lang="zh-CN" altLang="en-US"/>
           </a:p>
@@ -1028,7 +1032,6 @@
               <a:rPr lang="zh-CN" altLang="en-US" smtClean="0"/>
               <a:t>单击此处编辑母版文本样式</a:t>
             </a:r>
-            <a:endParaRPr lang="zh-CN" altLang="en-US" smtClean="0"/>
           </a:p>
         </p:txBody>
       </p:sp>
@@ -1049,6 +1052,8 @@
           <a:p>
             <a:fld id="{4192D431-89EB-426C-A91B-DFD7E8C5B2E7}" type="datetimeFigureOut">
               <a:rPr lang="zh-CN" altLang="en-US" smtClean="0"/>
+              <a:pPr/>
+              <a:t>2018/1/23</a:t>
             </a:fld>
             <a:endParaRPr lang="zh-CN" altLang="en-US"/>
           </a:p>
@@ -1090,6 +1095,8 @@
           <a:p>
             <a:fld id="{A9388ECA-052F-47F2-9B79-C3CD57F0E260}" type="slidenum">
               <a:rPr lang="zh-CN" altLang="en-US" smtClean="0"/>
+              <a:pPr/>
+              <a:t>‹#›</a:t>
             </a:fld>
             <a:endParaRPr lang="zh-CN" altLang="en-US"/>
           </a:p>
@@ -1196,7 +1203,6 @@
               <a:rPr lang="zh-CN" altLang="en-US" smtClean="0"/>
               <a:t>单击此处编辑母版文本样式</a:t>
             </a:r>
-            <a:endParaRPr lang="zh-CN" altLang="en-US" smtClean="0"/>
           </a:p>
           <a:p>
             <a:pPr lvl="1"/>
@@ -1204,7 +1210,6 @@
               <a:rPr lang="zh-CN" altLang="en-US" smtClean="0"/>
               <a:t>第二级</a:t>
             </a:r>
-            <a:endParaRPr lang="zh-CN" altLang="en-US" smtClean="0"/>
           </a:p>
           <a:p>
             <a:pPr lvl="2"/>
@@ -1212,7 +1217,6 @@
               <a:rPr lang="zh-CN" altLang="en-US" smtClean="0"/>
               <a:t>第三级</a:t>
             </a:r>
-            <a:endParaRPr lang="zh-CN" altLang="en-US" smtClean="0"/>
           </a:p>
           <a:p>
             <a:pPr lvl="3"/>
@@ -1220,7 +1224,6 @@
               <a:rPr lang="zh-CN" altLang="en-US" smtClean="0"/>
               <a:t>第四级</a:t>
             </a:r>
-            <a:endParaRPr lang="zh-CN" altLang="en-US" smtClean="0"/>
           </a:p>
           <a:p>
             <a:pPr lvl="4"/>
@@ -1285,7 +1288,6 @@
               <a:rPr lang="zh-CN" altLang="en-US" smtClean="0"/>
               <a:t>单击此处编辑母版文本样式</a:t>
             </a:r>
-            <a:endParaRPr lang="zh-CN" altLang="en-US" smtClean="0"/>
           </a:p>
           <a:p>
             <a:pPr lvl="1"/>
@@ -1293,7 +1295,6 @@
               <a:rPr lang="zh-CN" altLang="en-US" smtClean="0"/>
               <a:t>第二级</a:t>
             </a:r>
-            <a:endParaRPr lang="zh-CN" altLang="en-US" smtClean="0"/>
           </a:p>
           <a:p>
             <a:pPr lvl="2"/>
@@ -1301,7 +1302,6 @@
               <a:rPr lang="zh-CN" altLang="en-US" smtClean="0"/>
               <a:t>第三级</a:t>
             </a:r>
-            <a:endParaRPr lang="zh-CN" altLang="en-US" smtClean="0"/>
           </a:p>
           <a:p>
             <a:pPr lvl="3"/>
@@ -1309,7 +1309,6 @@
               <a:rPr lang="zh-CN" altLang="en-US" smtClean="0"/>
               <a:t>第四级</a:t>
             </a:r>
-            <a:endParaRPr lang="zh-CN" altLang="en-US" smtClean="0"/>
           </a:p>
           <a:p>
             <a:pPr lvl="4"/>
@@ -1338,6 +1337,8 @@
           <a:p>
             <a:fld id="{4192D431-89EB-426C-A91B-DFD7E8C5B2E7}" type="datetimeFigureOut">
               <a:rPr lang="zh-CN" altLang="en-US" smtClean="0"/>
+              <a:pPr/>
+              <a:t>2018/1/23</a:t>
             </a:fld>
             <a:endParaRPr lang="zh-CN" altLang="en-US"/>
           </a:p>
@@ -1379,6 +1380,8 @@
           <a:p>
             <a:fld id="{A9388ECA-052F-47F2-9B79-C3CD57F0E260}" type="slidenum">
               <a:rPr lang="zh-CN" altLang="en-US" smtClean="0"/>
+              <a:pPr/>
+              <a:t>‹#›</a:t>
             </a:fld>
             <a:endParaRPr lang="zh-CN" altLang="en-US"/>
           </a:p>
@@ -1498,7 +1501,6 @@
               <a:rPr lang="zh-CN" altLang="en-US" smtClean="0"/>
               <a:t>单击此处编辑母版文本样式</a:t>
             </a:r>
-            <a:endParaRPr lang="zh-CN" altLang="en-US" smtClean="0"/>
           </a:p>
         </p:txBody>
       </p:sp>
@@ -1555,7 +1557,6 @@
               <a:rPr lang="zh-CN" altLang="en-US" smtClean="0"/>
               <a:t>单击此处编辑母版文本样式</a:t>
             </a:r>
-            <a:endParaRPr lang="zh-CN" altLang="en-US" smtClean="0"/>
           </a:p>
           <a:p>
             <a:pPr lvl="1"/>
@@ -1563,7 +1564,6 @@
               <a:rPr lang="zh-CN" altLang="en-US" smtClean="0"/>
               <a:t>第二级</a:t>
             </a:r>
-            <a:endParaRPr lang="zh-CN" altLang="en-US" smtClean="0"/>
           </a:p>
           <a:p>
             <a:pPr lvl="2"/>
@@ -1571,7 +1571,6 @@
               <a:rPr lang="zh-CN" altLang="en-US" smtClean="0"/>
               <a:t>第三级</a:t>
             </a:r>
-            <a:endParaRPr lang="zh-CN" altLang="en-US" smtClean="0"/>
           </a:p>
           <a:p>
             <a:pPr lvl="3"/>
@@ -1579,7 +1578,6 @@
               <a:rPr lang="zh-CN" altLang="en-US" smtClean="0"/>
               <a:t>第四级</a:t>
             </a:r>
-            <a:endParaRPr lang="zh-CN" altLang="en-US" smtClean="0"/>
           </a:p>
           <a:p>
             <a:pPr lvl="4"/>
@@ -1653,7 +1651,6 @@
               <a:rPr lang="zh-CN" altLang="en-US" smtClean="0"/>
               <a:t>单击此处编辑母版文本样式</a:t>
             </a:r>
-            <a:endParaRPr lang="zh-CN" altLang="en-US" smtClean="0"/>
           </a:p>
         </p:txBody>
       </p:sp>
@@ -1710,7 +1707,6 @@
               <a:rPr lang="zh-CN" altLang="en-US" smtClean="0"/>
               <a:t>单击此处编辑母版文本样式</a:t>
             </a:r>
-            <a:endParaRPr lang="zh-CN" altLang="en-US" smtClean="0"/>
           </a:p>
           <a:p>
             <a:pPr lvl="1"/>
@@ -1718,7 +1714,6 @@
               <a:rPr lang="zh-CN" altLang="en-US" smtClean="0"/>
               <a:t>第二级</a:t>
             </a:r>
-            <a:endParaRPr lang="zh-CN" altLang="en-US" smtClean="0"/>
           </a:p>
           <a:p>
             <a:pPr lvl="2"/>
@@ -1726,7 +1721,6 @@
               <a:rPr lang="zh-CN" altLang="en-US" smtClean="0"/>
               <a:t>第三级</a:t>
             </a:r>
-            <a:endParaRPr lang="zh-CN" altLang="en-US" smtClean="0"/>
           </a:p>
           <a:p>
             <a:pPr lvl="3"/>
@@ -1734,7 +1728,6 @@
               <a:rPr lang="zh-CN" altLang="en-US" smtClean="0"/>
               <a:t>第四级</a:t>
             </a:r>
-            <a:endParaRPr lang="zh-CN" altLang="en-US" smtClean="0"/>
           </a:p>
           <a:p>
             <a:pPr lvl="4"/>
@@ -1763,6 +1756,8 @@
           <a:p>
             <a:fld id="{4192D431-89EB-426C-A91B-DFD7E8C5B2E7}" type="datetimeFigureOut">
               <a:rPr lang="zh-CN" altLang="en-US" smtClean="0"/>
+              <a:pPr/>
+              <a:t>2018/1/23</a:t>
             </a:fld>
             <a:endParaRPr lang="zh-CN" altLang="en-US"/>
           </a:p>
@@ -1804,6 +1799,8 @@
           <a:p>
             <a:fld id="{A9388ECA-052F-47F2-9B79-C3CD57F0E260}" type="slidenum">
               <a:rPr lang="zh-CN" altLang="en-US" smtClean="0"/>
+              <a:pPr/>
+              <a:t>‹#›</a:t>
             </a:fld>
             <a:endParaRPr lang="zh-CN" altLang="en-US"/>
           </a:p>
@@ -1874,6 +1871,8 @@
           <a:p>
             <a:fld id="{4192D431-89EB-426C-A91B-DFD7E8C5B2E7}" type="datetimeFigureOut">
               <a:rPr lang="zh-CN" altLang="en-US" smtClean="0"/>
+              <a:pPr/>
+              <a:t>2018/1/23</a:t>
             </a:fld>
             <a:endParaRPr lang="zh-CN" altLang="en-US"/>
           </a:p>
@@ -1915,6 +1914,8 @@
           <a:p>
             <a:fld id="{A9388ECA-052F-47F2-9B79-C3CD57F0E260}" type="slidenum">
               <a:rPr lang="zh-CN" altLang="en-US" smtClean="0"/>
+              <a:pPr/>
+              <a:t>‹#›</a:t>
             </a:fld>
             <a:endParaRPr lang="zh-CN" altLang="en-US"/>
           </a:p>
@@ -1962,6 +1963,8 @@
           <a:p>
             <a:fld id="{4192D431-89EB-426C-A91B-DFD7E8C5B2E7}" type="datetimeFigureOut">
               <a:rPr lang="zh-CN" altLang="en-US" smtClean="0"/>
+              <a:pPr/>
+              <a:t>2018/1/23</a:t>
             </a:fld>
             <a:endParaRPr lang="zh-CN" altLang="en-US"/>
           </a:p>
@@ -2003,6 +2006,8 @@
           <a:p>
             <a:fld id="{A9388ECA-052F-47F2-9B79-C3CD57F0E260}" type="slidenum">
               <a:rPr lang="zh-CN" altLang="en-US" smtClean="0"/>
+              <a:pPr/>
+              <a:t>‹#›</a:t>
             </a:fld>
             <a:endParaRPr lang="zh-CN" altLang="en-US"/>
           </a:p>
@@ -2118,7 +2123,6 @@
               <a:rPr lang="zh-CN" altLang="en-US" smtClean="0"/>
               <a:t>单击此处编辑母版文本样式</a:t>
             </a:r>
-            <a:endParaRPr lang="zh-CN" altLang="en-US" smtClean="0"/>
           </a:p>
           <a:p>
             <a:pPr lvl="1"/>
@@ -2126,7 +2130,6 @@
               <a:rPr lang="zh-CN" altLang="en-US" smtClean="0"/>
               <a:t>第二级</a:t>
             </a:r>
-            <a:endParaRPr lang="zh-CN" altLang="en-US" smtClean="0"/>
           </a:p>
           <a:p>
             <a:pPr lvl="2"/>
@@ -2134,7 +2137,6 @@
               <a:rPr lang="zh-CN" altLang="en-US" smtClean="0"/>
               <a:t>第三级</a:t>
             </a:r>
-            <a:endParaRPr lang="zh-CN" altLang="en-US" smtClean="0"/>
           </a:p>
           <a:p>
             <a:pPr lvl="3"/>
@@ -2142,7 +2144,6 @@
               <a:rPr lang="zh-CN" altLang="en-US" smtClean="0"/>
               <a:t>第四级</a:t>
             </a:r>
-            <a:endParaRPr lang="zh-CN" altLang="en-US" smtClean="0"/>
           </a:p>
           <a:p>
             <a:pPr lvl="4"/>
@@ -2216,7 +2217,6 @@
               <a:rPr lang="zh-CN" altLang="en-US" smtClean="0"/>
               <a:t>单击此处编辑母版文本样式</a:t>
             </a:r>
-            <a:endParaRPr lang="zh-CN" altLang="en-US" smtClean="0"/>
           </a:p>
         </p:txBody>
       </p:sp>
@@ -2237,6 +2237,8 @@
           <a:p>
             <a:fld id="{4192D431-89EB-426C-A91B-DFD7E8C5B2E7}" type="datetimeFigureOut">
               <a:rPr lang="zh-CN" altLang="en-US" smtClean="0"/>
+              <a:pPr/>
+              <a:t>2018/1/23</a:t>
             </a:fld>
             <a:endParaRPr lang="zh-CN" altLang="en-US"/>
           </a:p>
@@ -2278,6 +2280,8 @@
           <a:p>
             <a:fld id="{A9388ECA-052F-47F2-9B79-C3CD57F0E260}" type="slidenum">
               <a:rPr lang="zh-CN" altLang="en-US" smtClean="0"/>
+              <a:pPr/>
+              <a:t>‹#›</a:t>
             </a:fld>
             <a:endParaRPr lang="zh-CN" altLang="en-US"/>
           </a:p>
@@ -2463,7 +2467,6 @@
               <a:rPr lang="zh-CN" altLang="en-US" smtClean="0"/>
               <a:t>单击此处编辑母版文本样式</a:t>
             </a:r>
-            <a:endParaRPr lang="zh-CN" altLang="en-US" smtClean="0"/>
           </a:p>
         </p:txBody>
       </p:sp>
@@ -2484,6 +2487,8 @@
           <a:p>
             <a:fld id="{4192D431-89EB-426C-A91B-DFD7E8C5B2E7}" type="datetimeFigureOut">
               <a:rPr lang="zh-CN" altLang="en-US" smtClean="0"/>
+              <a:pPr/>
+              <a:t>2018/1/23</a:t>
             </a:fld>
             <a:endParaRPr lang="zh-CN" altLang="en-US"/>
           </a:p>
@@ -2525,6 +2530,8 @@
           <a:p>
             <a:fld id="{A9388ECA-052F-47F2-9B79-C3CD57F0E260}" type="slidenum">
               <a:rPr lang="zh-CN" altLang="en-US" smtClean="0"/>
+              <a:pPr/>
+              <a:t>‹#›</a:t>
             </a:fld>
             <a:endParaRPr lang="zh-CN" altLang="en-US"/>
           </a:p>
@@ -2623,7 +2630,6 @@
               <a:rPr lang="zh-CN" altLang="en-US" smtClean="0"/>
               <a:t>单击此处编辑母版文本样式</a:t>
             </a:r>
-            <a:endParaRPr lang="zh-CN" altLang="en-US" smtClean="0"/>
           </a:p>
           <a:p>
             <a:pPr lvl="1"/>
@@ -2631,7 +2637,6 @@
               <a:rPr lang="zh-CN" altLang="en-US" smtClean="0"/>
               <a:t>第二级</a:t>
             </a:r>
-            <a:endParaRPr lang="zh-CN" altLang="en-US" smtClean="0"/>
           </a:p>
           <a:p>
             <a:pPr lvl="2"/>
@@ -2639,7 +2644,6 @@
               <a:rPr lang="zh-CN" altLang="en-US" smtClean="0"/>
               <a:t>第三级</a:t>
             </a:r>
-            <a:endParaRPr lang="zh-CN" altLang="en-US" smtClean="0"/>
           </a:p>
           <a:p>
             <a:pPr lvl="3"/>
@@ -2647,7 +2651,6 @@
               <a:rPr lang="zh-CN" altLang="en-US" smtClean="0"/>
               <a:t>第四级</a:t>
             </a:r>
-            <a:endParaRPr lang="zh-CN" altLang="en-US" smtClean="0"/>
           </a:p>
           <a:p>
             <a:pPr lvl="4"/>
@@ -2694,6 +2697,8 @@
           <a:p>
             <a:fld id="{4192D431-89EB-426C-A91B-DFD7E8C5B2E7}" type="datetimeFigureOut">
               <a:rPr lang="zh-CN" altLang="en-US" smtClean="0"/>
+              <a:pPr/>
+              <a:t>2018/1/23</a:t>
             </a:fld>
             <a:endParaRPr lang="zh-CN" altLang="en-US"/>
           </a:p>
@@ -2771,6 +2776,8 @@
           <a:p>
             <a:fld id="{A9388ECA-052F-47F2-9B79-C3CD57F0E260}" type="slidenum">
               <a:rPr lang="zh-CN" altLang="en-US" smtClean="0"/>
+              <a:pPr/>
+              <a:t>‹#›</a:t>
             </a:fld>
             <a:endParaRPr lang="zh-CN" altLang="en-US"/>
           </a:p>
@@ -3206,18 +3213,6 @@
               </a:rPr>
               <a:t>框架主要特性</a:t>
             </a:r>
-            <a:endParaRPr lang="zh-CN" altLang="en-US" b="1" dirty="0" smtClean="0">
-              <a:solidFill>
-                <a:schemeClr val="tx1"/>
-              </a:solidFill>
-              <a:effectLst>
-                <a:outerShdw blurRad="38100" dist="38100" dir="2700000" algn="tl">
-                  <a:srgbClr val="000000">
-                    <a:alpha val="43137"/>
-                  </a:srgbClr>
-                </a:outerShdw>
-              </a:effectLst>
-            </a:endParaRPr>
           </a:p>
           <a:p>
             <a:pPr marL="514350" indent="-514350" algn="l">
@@ -3293,7 +3288,14 @@
         <p:cNvGrpSpPr/>
         <p:nvPr/>
       </p:nvGrpSpPr>
-      <p:grpSpPr/>
+      <p:grpSpPr>
+        <a:xfrm>
+          <a:off x="0" y="0"/>
+          <a:ext cx="0" cy="0"/>
+          <a:chOff x="0" y="0"/>
+          <a:chExt cx="0" cy="0"/>
+        </a:xfrm>
+      </p:grpSpPr>
       <p:sp>
         <p:nvSpPr>
           <p:cNvPr id="2" name="标题 1"/>
@@ -3307,6 +3309,7 @@
         <p:spPr/>
         <p:txBody>
           <a:bodyPr/>
+          <a:lstStyle/>
           <a:p>
             <a:endParaRPr lang="zh-CN" altLang="en-US"/>
           </a:p>
@@ -3325,6 +3328,7 @@
         <p:spPr/>
         <p:txBody>
           <a:bodyPr/>
+          <a:lstStyle/>
           <a:p>
             <a:endParaRPr lang="zh-CN" altLang="en-US"/>
           </a:p>
@@ -3347,7 +3351,14 @@
         <p:cNvGrpSpPr/>
         <p:nvPr/>
       </p:nvGrpSpPr>
-      <p:grpSpPr/>
+      <p:grpSpPr>
+        <a:xfrm>
+          <a:off x="0" y="0"/>
+          <a:ext cx="0" cy="0"/>
+          <a:chOff x="0" y="0"/>
+          <a:chExt cx="0" cy="0"/>
+        </a:xfrm>
+      </p:grpSpPr>
       <p:sp>
         <p:nvSpPr>
           <p:cNvPr id="2" name="标题 1"/>
@@ -3361,6 +3372,7 @@
         <p:spPr/>
         <p:txBody>
           <a:bodyPr/>
+          <a:lstStyle/>
           <a:p>
             <a:endParaRPr lang="zh-CN" altLang="en-US"/>
           </a:p>
@@ -3379,6 +3391,7 @@
         <p:spPr/>
         <p:txBody>
           <a:bodyPr/>
+          <a:lstStyle/>
           <a:p>
             <a:endParaRPr lang="zh-CN" altLang="en-US"/>
           </a:p>
@@ -3635,7 +3648,6 @@
               <a:rPr lang="en-US" altLang="zh-CN" dirty="0" smtClean="0"/>
               <a:t>BATCH_LOG_SUMMARY, BATCH_LOG_FAILDTL</a:t>
             </a:r>
-            <a:endParaRPr lang="en-US" altLang="zh-CN" dirty="0" smtClean="0"/>
           </a:p>
           <a:p>
             <a:endParaRPr lang="en-US" altLang="zh-CN" dirty="0" smtClean="0"/>
@@ -3702,7 +3714,6 @@
               <a:rPr lang="zh-CN" altLang="en-US"/>
               <a:t>管理 支持每读取一条数据，处理一条数据，集中一次写，提升批处理应用的处理效率</a:t>
             </a:r>
-            <a:endParaRPr lang="zh-CN" altLang="en-US"/>
           </a:p>
           <a:p>
             <a:endParaRPr lang="zh-CN" altLang="en-US"/>
@@ -3718,7 +3729,7 @@
           <p:nvPr/>
         </p:nvPicPr>
         <p:blipFill>
-          <a:blip r:embed="rId1"/>
+          <a:blip r:embed="rId2"/>
           <a:stretch>
             <a:fillRect/>
           </a:stretch>
@@ -3750,7 +3761,14 @@
         <p:cNvGrpSpPr/>
         <p:nvPr/>
       </p:nvGrpSpPr>
-      <p:grpSpPr/>
+      <p:grpSpPr>
+        <a:xfrm>
+          <a:off x="0" y="0"/>
+          <a:ext cx="0" cy="0"/>
+          <a:chOff x="0" y="0"/>
+          <a:chExt cx="0" cy="0"/>
+        </a:xfrm>
+      </p:grpSpPr>
       <p:sp>
         <p:nvSpPr>
           <p:cNvPr id="3" name="内容占位符 2"/>
@@ -3769,6 +3787,7 @@
         </p:spPr>
         <p:txBody>
           <a:bodyPr/>
+          <a:lstStyle/>
           <a:p>
             <a:r>
               <a:rPr lang="zh-CN" altLang="en-US"/>
@@ -3798,7 +3817,6 @@
               <a:rPr lang="zh-CN" altLang="en-US"/>
               <a:t>设置独立的事务配置，传播行为。</a:t>
             </a:r>
-            <a:endParaRPr lang="zh-CN" altLang="en-US"/>
           </a:p>
           <a:p>
             <a:r>
@@ -3831,7 +3849,6 @@
               <a:rPr lang="zh-CN" altLang="en-US"/>
               <a:t>。</a:t>
             </a:r>
-            <a:endParaRPr lang="zh-CN" altLang="en-US"/>
           </a:p>
           <a:p>
             <a:r>
@@ -3846,7 +3863,6 @@
               <a:rPr lang="zh-CN" altLang="en-US"/>
               <a:t>，满足数据性能需要</a:t>
             </a:r>
-            <a:endParaRPr lang="zh-CN" altLang="en-US"/>
           </a:p>
         </p:txBody>
       </p:sp>
@@ -3973,14 +3989,12 @@
               <a:rPr lang="zh-CN" altLang="en-US" dirty="0"/>
               <a:t>文件案例</a:t>
             </a:r>
-            <a:endParaRPr lang="zh-CN" altLang="en-US" dirty="0"/>
           </a:p>
           <a:p>
             <a:r>
               <a:rPr lang="zh-CN" altLang="en-US" dirty="0"/>
               <a:t>读取数据库文件案例</a:t>
             </a:r>
-            <a:endParaRPr lang="zh-CN" altLang="en-US" dirty="0"/>
           </a:p>
           <a:p>
             <a:r>
@@ -3993,28 +4007,22 @@
             </a:r>
             <a:r>
               <a:rPr lang="zh-CN" altLang="en-US" dirty="0"/>
-              <a:t>条件选择</a:t>
+              <a:t>条件选择案例</a:t>
+            </a:r>
+          </a:p>
+          <a:p>
+            <a:r>
+              <a:rPr lang="zh-CN" altLang="en-US" dirty="0"/>
+              <a:t>分区</a:t>
+            </a:r>
+            <a:r>
+              <a:rPr lang="en-US" altLang="zh-CN" dirty="0"/>
+              <a:t>Step</a:t>
             </a:r>
             <a:r>
               <a:rPr lang="zh-CN" altLang="en-US" dirty="0"/>
               <a:t>案例</a:t>
             </a:r>
-            <a:endParaRPr lang="zh-CN" altLang="en-US" dirty="0"/>
-          </a:p>
-          <a:p>
-            <a:r>
-              <a:rPr lang="zh-CN" altLang="en-US" dirty="0"/>
-              <a:t>分区</a:t>
-            </a:r>
-            <a:r>
-              <a:rPr lang="en-US" altLang="zh-CN" dirty="0"/>
-              <a:t>Step</a:t>
-            </a:r>
-            <a:r>
-              <a:rPr lang="zh-CN" altLang="en-US" dirty="0"/>
-              <a:t>案例</a:t>
-            </a:r>
-            <a:endParaRPr lang="zh-CN" altLang="en-US" dirty="0"/>
           </a:p>
         </p:txBody>
       </p:sp>
@@ -4035,7 +4043,14 @@
         <p:cNvGrpSpPr/>
         <p:nvPr/>
       </p:nvGrpSpPr>
-      <p:grpSpPr/>
+      <p:grpSpPr>
+        <a:xfrm>
+          <a:off x="0" y="0"/>
+          <a:ext cx="0" cy="0"/>
+          <a:chOff x="0" y="0"/>
+          <a:chExt cx="0" cy="0"/>
+        </a:xfrm>
+      </p:grpSpPr>
       <p:sp>
         <p:nvSpPr>
           <p:cNvPr id="2" name="标题 1"/>
@@ -4049,6 +4064,7 @@
         <p:spPr/>
         <p:txBody>
           <a:bodyPr/>
+          <a:lstStyle/>
           <a:p>
             <a:endParaRPr lang="zh-CN" altLang="en-US"/>
           </a:p>
@@ -4067,6 +4083,7 @@
         <p:spPr/>
         <p:txBody>
           <a:bodyPr/>
+          <a:lstStyle/>
           <a:p>
             <a:endParaRPr lang="zh-CN" altLang="en-US"/>
           </a:p>
@@ -4089,7 +4106,14 @@
         <p:cNvGrpSpPr/>
         <p:nvPr/>
       </p:nvGrpSpPr>
-      <p:grpSpPr/>
+      <p:grpSpPr>
+        <a:xfrm>
+          <a:off x="0" y="0"/>
+          <a:ext cx="0" cy="0"/>
+          <a:chOff x="0" y="0"/>
+          <a:chExt cx="0" cy="0"/>
+        </a:xfrm>
+      </p:grpSpPr>
       <p:sp>
         <p:nvSpPr>
           <p:cNvPr id="2" name="标题 1"/>
@@ -4103,6 +4127,7 @@
         <p:spPr/>
         <p:txBody>
           <a:bodyPr/>
+          <a:lstStyle/>
           <a:p>
             <a:endParaRPr lang="zh-CN" altLang="en-US"/>
           </a:p>
@@ -4121,6 +4146,7 @@
         <p:spPr/>
         <p:txBody>
           <a:bodyPr/>
+          <a:lstStyle/>
           <a:p>
             <a:endParaRPr lang="zh-CN" altLang="en-US"/>
           </a:p>
@@ -4143,7 +4169,14 @@
         <p:cNvGrpSpPr/>
         <p:nvPr/>
       </p:nvGrpSpPr>
-      <p:grpSpPr/>
+      <p:grpSpPr>
+        <a:xfrm>
+          <a:off x="0" y="0"/>
+          <a:ext cx="0" cy="0"/>
+          <a:chOff x="0" y="0"/>
+          <a:chExt cx="0" cy="0"/>
+        </a:xfrm>
+      </p:grpSpPr>
       <p:sp>
         <p:nvSpPr>
           <p:cNvPr id="2" name="标题 1"/>
@@ -4157,6 +4190,7 @@
         <p:spPr/>
         <p:txBody>
           <a:bodyPr/>
+          <a:lstStyle/>
           <a:p>
             <a:endParaRPr lang="zh-CN" altLang="en-US"/>
           </a:p>
@@ -4175,6 +4209,7 @@
         <p:spPr/>
         <p:txBody>
           <a:bodyPr/>
+          <a:lstStyle/>
           <a:p>
             <a:endParaRPr lang="zh-CN" altLang="en-US"/>
           </a:p>
@@ -4466,9 +4501,11 @@
       </a:bgFillStyleLst>
     </a:fmtScheme>
   </a:themeElements>
+  <a:objectDefaults/>
+  <a:extraClrSchemeLst/>
   <a:extLst>
     <a:ext uri="{05A4C25C-085E-4340-85A3-A5531E510DB2}">
-      <thm15:themeFamily xmlns:thm15="http://schemas.microsoft.com/office/thememl/2012/main" name="Office Theme" id="{62F939B6-93AF-4DB8-9C6B-D6C7DFDC589F}" vid="{4A3C46E8-61CC-4603-A589-7422A47A8E4A}"/>
+      <thm15:themeFamily xmlns:thm15="http://schemas.microsoft.com/office/thememl/2012/main" xmlns="" name="Office Theme" id="{62F939B6-93AF-4DB8-9C6B-D6C7DFDC589F}" vid="{4A3C46E8-61CC-4603-A589-7422A47A8E4A}"/>
     </a:ext>
   </a:extLst>
 </a:theme>

</xml_diff>

<commit_message>
spring batch 多 step 分区案例
</commit_message>
<xml_diff>
--- a/src/main/resources/doc/Spring-batch.pptx
+++ b/src/main/resources/doc/Spring-batch.pptx
@@ -16,9 +16,10 @@
     <p:sldId id="264" r:id="rId10"/>
     <p:sldId id="272" r:id="rId11"/>
     <p:sldId id="271" r:id="rId12"/>
-    <p:sldId id="266" r:id="rId13"/>
-    <p:sldId id="267" r:id="rId14"/>
-    <p:sldId id="269" r:id="rId15"/>
+    <p:sldId id="273" r:id="rId13"/>
+    <p:sldId id="266" r:id="rId14"/>
+    <p:sldId id="267" r:id="rId15"/>
+    <p:sldId id="269" r:id="rId16"/>
   </p:sldIdLst>
   <p:sldSz cx="9144000" cy="6858000" type="screen4x3"/>
   <p:notesSz cx="6858000" cy="9144000"/>
@@ -302,7 +303,7 @@
             <a:fld id="{4192D431-89EB-426C-A91B-DFD7E8C5B2E7}" type="datetimeFigureOut">
               <a:rPr lang="zh-CN" altLang="en-US" smtClean="0"/>
               <a:pPr/>
-              <a:t>2018/1/28</a:t>
+              <a:t>2018/2/4</a:t>
             </a:fld>
             <a:endParaRPr lang="zh-CN" altLang="en-US"/>
           </a:p>
@@ -469,7 +470,7 @@
             <a:fld id="{4192D431-89EB-426C-A91B-DFD7E8C5B2E7}" type="datetimeFigureOut">
               <a:rPr lang="zh-CN" altLang="en-US" smtClean="0"/>
               <a:pPr/>
-              <a:t>2018/1/28</a:t>
+              <a:t>2018/2/4</a:t>
             </a:fld>
             <a:endParaRPr lang="zh-CN" altLang="en-US"/>
           </a:p>
@@ -646,7 +647,7 @@
             <a:fld id="{4192D431-89EB-426C-A91B-DFD7E8C5B2E7}" type="datetimeFigureOut">
               <a:rPr lang="zh-CN" altLang="en-US" smtClean="0"/>
               <a:pPr/>
-              <a:t>2018/1/28</a:t>
+              <a:t>2018/2/4</a:t>
             </a:fld>
             <a:endParaRPr lang="zh-CN" altLang="en-US"/>
           </a:p>
@@ -813,7 +814,7 @@
             <a:fld id="{4192D431-89EB-426C-A91B-DFD7E8C5B2E7}" type="datetimeFigureOut">
               <a:rPr lang="zh-CN" altLang="en-US" smtClean="0"/>
               <a:pPr/>
-              <a:t>2018/1/28</a:t>
+              <a:t>2018/2/4</a:t>
             </a:fld>
             <a:endParaRPr lang="zh-CN" altLang="en-US"/>
           </a:p>
@@ -1056,7 +1057,7 @@
             <a:fld id="{4192D431-89EB-426C-A91B-DFD7E8C5B2E7}" type="datetimeFigureOut">
               <a:rPr lang="zh-CN" altLang="en-US" smtClean="0"/>
               <a:pPr/>
-              <a:t>2018/1/28</a:t>
+              <a:t>2018/2/4</a:t>
             </a:fld>
             <a:endParaRPr lang="zh-CN" altLang="en-US"/>
           </a:p>
@@ -1341,7 +1342,7 @@
             <a:fld id="{4192D431-89EB-426C-A91B-DFD7E8C5B2E7}" type="datetimeFigureOut">
               <a:rPr lang="zh-CN" altLang="en-US" smtClean="0"/>
               <a:pPr/>
-              <a:t>2018/1/28</a:t>
+              <a:t>2018/2/4</a:t>
             </a:fld>
             <a:endParaRPr lang="zh-CN" altLang="en-US"/>
           </a:p>
@@ -1760,7 +1761,7 @@
             <a:fld id="{4192D431-89EB-426C-A91B-DFD7E8C5B2E7}" type="datetimeFigureOut">
               <a:rPr lang="zh-CN" altLang="en-US" smtClean="0"/>
               <a:pPr/>
-              <a:t>2018/1/28</a:t>
+              <a:t>2018/2/4</a:t>
             </a:fld>
             <a:endParaRPr lang="zh-CN" altLang="en-US"/>
           </a:p>
@@ -1875,7 +1876,7 @@
             <a:fld id="{4192D431-89EB-426C-A91B-DFD7E8C5B2E7}" type="datetimeFigureOut">
               <a:rPr lang="zh-CN" altLang="en-US" smtClean="0"/>
               <a:pPr/>
-              <a:t>2018/1/28</a:t>
+              <a:t>2018/2/4</a:t>
             </a:fld>
             <a:endParaRPr lang="zh-CN" altLang="en-US"/>
           </a:p>
@@ -1967,7 +1968,7 @@
             <a:fld id="{4192D431-89EB-426C-A91B-DFD7E8C5B2E7}" type="datetimeFigureOut">
               <a:rPr lang="zh-CN" altLang="en-US" smtClean="0"/>
               <a:pPr/>
-              <a:t>2018/1/28</a:t>
+              <a:t>2018/2/4</a:t>
             </a:fld>
             <a:endParaRPr lang="zh-CN" altLang="en-US"/>
           </a:p>
@@ -2241,7 +2242,7 @@
             <a:fld id="{4192D431-89EB-426C-A91B-DFD7E8C5B2E7}" type="datetimeFigureOut">
               <a:rPr lang="zh-CN" altLang="en-US" smtClean="0"/>
               <a:pPr/>
-              <a:t>2018/1/28</a:t>
+              <a:t>2018/2/4</a:t>
             </a:fld>
             <a:endParaRPr lang="zh-CN" altLang="en-US"/>
           </a:p>
@@ -2491,7 +2492,7 @@
             <a:fld id="{4192D431-89EB-426C-A91B-DFD7E8C5B2E7}" type="datetimeFigureOut">
               <a:rPr lang="zh-CN" altLang="en-US" smtClean="0"/>
               <a:pPr/>
-              <a:t>2018/1/28</a:t>
+              <a:t>2018/2/4</a:t>
             </a:fld>
             <a:endParaRPr lang="zh-CN" altLang="en-US"/>
           </a:p>
@@ -2701,7 +2702,7 @@
             <a:fld id="{4192D431-89EB-426C-A91B-DFD7E8C5B2E7}" type="datetimeFigureOut">
               <a:rPr lang="zh-CN" altLang="en-US" smtClean="0"/>
               <a:pPr/>
-              <a:t>2018/1/28</a:t>
+              <a:t>2018/2/4</a:t>
             </a:fld>
             <a:endParaRPr lang="zh-CN" altLang="en-US"/>
           </a:p>
@@ -3375,11 +3376,7 @@
             </a:r>
             <a:r>
               <a:rPr lang="zh-CN" altLang="en-US" dirty="0" smtClean="0"/>
-              <a:t>的命名空间下创建一</a:t>
-            </a:r>
-            <a:r>
-              <a:rPr lang="zh-CN" altLang="en-US" dirty="0" smtClean="0"/>
-              <a:t>个</a:t>
+              <a:t>的命名空间下创建一个</a:t>
             </a:r>
             <a:r>
               <a:rPr lang="en-US" dirty="0" smtClean="0"/>
@@ -3394,11 +3391,7 @@
           <a:p>
             <a:r>
               <a:rPr lang="en-US" dirty="0" smtClean="0"/>
-              <a:t> 2</a:t>
-            </a:r>
-            <a:r>
-              <a:rPr lang="en-US" dirty="0" smtClean="0"/>
-              <a:t>、</a:t>
+              <a:t> 2、</a:t>
             </a:r>
             <a:r>
               <a:rPr lang="zh-CN" altLang="en-US" dirty="0" smtClean="0"/>
@@ -3731,58 +3724,68 @@
           <a:chExt cx="0" cy="0"/>
         </a:xfrm>
       </p:grpSpPr>
-      <p:sp>
-        <p:nvSpPr>
-          <p:cNvPr id="2" name="标题 1"/>
-          <p:cNvSpPr>
-            <a:spLocks noGrp="1"/>
-          </p:cNvSpPr>
-          <p:nvPr>
-            <p:ph type="title"/>
-          </p:nvPr>
-        </p:nvSpPr>
+      <p:pic>
+        <p:nvPicPr>
+          <p:cNvPr id="4" name="内容占位符 3" descr="jobSetting.jpg"/>
+          <p:cNvPicPr>
+            <a:picLocks noGrp="1" noChangeAspect="1"/>
+          </p:cNvPicPr>
+          <p:nvPr>
+            <p:ph idx="1"/>
+          </p:nvPr>
+        </p:nvPicPr>
+        <p:blipFill>
+          <a:blip r:embed="rId2"/>
+          <a:stretch>
+            <a:fillRect/>
+          </a:stretch>
+        </p:blipFill>
         <p:spPr>
           <a:xfrm>
-            <a:off x="555625" y="274955"/>
-            <a:ext cx="8131175" cy="607695"/>
+            <a:off x="1500166" y="1142984"/>
+            <a:ext cx="5572164" cy="4903043"/>
           </a:xfrm>
         </p:spPr>
-        <p:txBody>
-          <a:bodyPr/>
-          <a:lstStyle/>
-          <a:p>
-            <a:pPr algn="l"/>
-            <a:r>
-              <a:rPr lang="zh-CN" altLang="en-US" sz="2400" dirty="0">
-                <a:sym typeface="+mn-ea"/>
-              </a:rPr>
-              <a:t>读取数据库文件案例</a:t>
-            </a:r>
-            <a:endParaRPr lang="zh-CN" altLang="en-US" sz="2400"/>
-          </a:p>
-        </p:txBody>
-      </p:sp>
-      <p:sp>
-        <p:nvSpPr>
-          <p:cNvPr id="3" name="内容占位符 2"/>
-          <p:cNvSpPr>
-            <a:spLocks noGrp="1"/>
-          </p:cNvSpPr>
-          <p:nvPr>
-            <p:ph idx="1"/>
-          </p:nvPr>
+      </p:pic>
+      <p:sp>
+        <p:nvSpPr>
+          <p:cNvPr id="5" name="TextBox 4"/>
+          <p:cNvSpPr txBox="1"/>
+          <p:nvPr/>
         </p:nvSpPr>
         <p:spPr>
           <a:xfrm>
-            <a:off x="506095" y="1032510"/>
-            <a:ext cx="8229600" cy="4525963"/>
+            <a:off x="714348" y="428604"/>
+            <a:ext cx="6572296" cy="461665"/>
           </a:xfrm>
+          <a:prstGeom prst="rect">
+            <a:avLst/>
+          </a:prstGeom>
+          <a:noFill/>
         </p:spPr>
         <p:txBody>
-          <a:bodyPr/>
-          <a:lstStyle/>
-          <a:p>
-            <a:endParaRPr lang="zh-CN" altLang="en-US"/>
+          <a:bodyPr wrap="square" rtlCol="0">
+            <a:spAutoFit/>
+          </a:bodyPr>
+          <a:lstStyle/>
+          <a:p>
+            <a:r>
+              <a:rPr lang="en-US" altLang="zh-CN" sz="2400" dirty="0" err="1" smtClean="0"/>
+              <a:t>SpringBatch</a:t>
+            </a:r>
+            <a:r>
+              <a:rPr lang="zh-CN" altLang="en-US" sz="2400" dirty="0" smtClean="0"/>
+              <a:t>配置文件</a:t>
+            </a:r>
+            <a:r>
+              <a:rPr lang="en-US" altLang="zh-CN" sz="2400" dirty="0" smtClean="0"/>
+              <a:t>Job</a:t>
+            </a:r>
+            <a:r>
+              <a:rPr lang="zh-CN" altLang="en-US" sz="2400" dirty="0" smtClean="0"/>
+              <a:t>配置层次结构图</a:t>
+            </a:r>
+            <a:endParaRPr lang="zh-CN" altLang="en-US" sz="2400" dirty="0"/>
           </a:p>
         </p:txBody>
       </p:sp>
@@ -3823,8 +3826,8 @@
         </p:nvSpPr>
         <p:spPr>
           <a:xfrm>
-            <a:off x="457200" y="274955"/>
-            <a:ext cx="8229600" cy="509905"/>
+            <a:off x="555625" y="274955"/>
+            <a:ext cx="8131175" cy="607695"/>
           </a:xfrm>
         </p:spPr>
         <p:txBody>
@@ -3836,19 +3839,7 @@
               <a:rPr lang="zh-CN" altLang="en-US" sz="2400" dirty="0">
                 <a:sym typeface="+mn-ea"/>
               </a:rPr>
-              <a:t>多</a:t>
-            </a:r>
-            <a:r>
-              <a:rPr lang="en-US" altLang="zh-CN" sz="2400" dirty="0">
-                <a:sym typeface="+mn-ea"/>
-              </a:rPr>
-              <a:t>Step</a:t>
-            </a:r>
-            <a:r>
-              <a:rPr lang="zh-CN" altLang="en-US" sz="2400" dirty="0">
-                <a:sym typeface="+mn-ea"/>
-              </a:rPr>
-              <a:t>条件选择案例</a:t>
+              <a:t>读取数据库文件案例</a:t>
             </a:r>
             <a:endParaRPr lang="zh-CN" altLang="en-US" sz="2400"/>
           </a:p>
@@ -3866,7 +3857,7 @@
         </p:nvSpPr>
         <p:spPr>
           <a:xfrm>
-            <a:off x="457200" y="982980"/>
+            <a:off x="506095" y="1032510"/>
             <a:ext cx="8229600" cy="4525963"/>
           </a:xfrm>
         </p:spPr>
@@ -3887,6 +3878,98 @@
 </file>
 
 <file path=ppt/slides/slide14.xml><?xml version="1.0" encoding="utf-8"?>
+<p:sld xmlns:a="http://schemas.openxmlformats.org/drawingml/2006/main" xmlns:r="http://schemas.openxmlformats.org/officeDocument/2006/relationships" xmlns:p="http://schemas.openxmlformats.org/presentationml/2006/main">
+  <p:cSld>
+    <p:spTree>
+      <p:nvGrpSpPr>
+        <p:cNvPr id="1" name=""/>
+        <p:cNvGrpSpPr/>
+        <p:nvPr/>
+      </p:nvGrpSpPr>
+      <p:grpSpPr>
+        <a:xfrm>
+          <a:off x="0" y="0"/>
+          <a:ext cx="0" cy="0"/>
+          <a:chOff x="0" y="0"/>
+          <a:chExt cx="0" cy="0"/>
+        </a:xfrm>
+      </p:grpSpPr>
+      <p:sp>
+        <p:nvSpPr>
+          <p:cNvPr id="2" name="标题 1"/>
+          <p:cNvSpPr>
+            <a:spLocks noGrp="1"/>
+          </p:cNvSpPr>
+          <p:nvPr>
+            <p:ph type="title"/>
+          </p:nvPr>
+        </p:nvSpPr>
+        <p:spPr>
+          <a:xfrm>
+            <a:off x="457200" y="274955"/>
+            <a:ext cx="8229600" cy="509905"/>
+          </a:xfrm>
+        </p:spPr>
+        <p:txBody>
+          <a:bodyPr/>
+          <a:lstStyle/>
+          <a:p>
+            <a:pPr algn="l"/>
+            <a:r>
+              <a:rPr lang="zh-CN" altLang="en-US" sz="2400" dirty="0">
+                <a:sym typeface="+mn-ea"/>
+              </a:rPr>
+              <a:t>多</a:t>
+            </a:r>
+            <a:r>
+              <a:rPr lang="en-US" altLang="zh-CN" sz="2400" dirty="0">
+                <a:sym typeface="+mn-ea"/>
+              </a:rPr>
+              <a:t>Step</a:t>
+            </a:r>
+            <a:r>
+              <a:rPr lang="zh-CN" altLang="en-US" sz="2400" dirty="0">
+                <a:sym typeface="+mn-ea"/>
+              </a:rPr>
+              <a:t>条件选择案例</a:t>
+            </a:r>
+            <a:endParaRPr lang="zh-CN" altLang="en-US" sz="2400"/>
+          </a:p>
+        </p:txBody>
+      </p:sp>
+      <p:sp>
+        <p:nvSpPr>
+          <p:cNvPr id="3" name="内容占位符 2"/>
+          <p:cNvSpPr>
+            <a:spLocks noGrp="1"/>
+          </p:cNvSpPr>
+          <p:nvPr>
+            <p:ph idx="1"/>
+          </p:nvPr>
+        </p:nvSpPr>
+        <p:spPr>
+          <a:xfrm>
+            <a:off x="457200" y="982980"/>
+            <a:ext cx="8229600" cy="4525963"/>
+          </a:xfrm>
+        </p:spPr>
+        <p:txBody>
+          <a:bodyPr/>
+          <a:lstStyle/>
+          <a:p>
+            <a:endParaRPr lang="zh-CN" altLang="en-US"/>
+          </a:p>
+        </p:txBody>
+      </p:sp>
+    </p:spTree>
+  </p:cSld>
+  <p:clrMapOvr>
+    <a:masterClrMapping/>
+  </p:clrMapOvr>
+</p:sld>
+</file>
+
+<file path=ppt/slides/slide15.xml><?xml version="1.0" encoding="utf-8"?>
 <p:sld xmlns:a="http://schemas.openxmlformats.org/drawingml/2006/main" xmlns:r="http://schemas.openxmlformats.org/officeDocument/2006/relationships" xmlns:p="http://schemas.openxmlformats.org/presentationml/2006/main">
   <p:cSld>
     <p:spTree>

</xml_diff>